<commit_message>
fix(removing title): removing title
</commit_message>
<xml_diff>
--- a/src/template.pptx
+++ b/src/template.pptx
@@ -3791,46 +3791,6 @@
           </a:p>
         </p:txBody>
       </p:sp>
-      <p:sp>
-        <p:nvSpPr>
-          <p:cNvPr id="14" name="CaixaDeTexto 13">
-            <a:extLst>
-              <a:ext uri="{FF2B5EF4-FFF2-40B4-BE49-F238E27FC236}">
-                <a16:creationId xmlns:a16="http://schemas.microsoft.com/office/drawing/2014/main" id="{64CE53F1-EC5E-41C0-9CA5-09994F7E08DF}"/>
-              </a:ext>
-            </a:extLst>
-          </p:cNvPr>
-          <p:cNvSpPr txBox="1"/>
-          <p:nvPr/>
-        </p:nvSpPr>
-        <p:spPr>
-          <a:xfrm>
-            <a:off x="8475016" y="160447"/>
-            <a:ext cx="3703258" cy="307777"/>
-          </a:xfrm>
-          <a:prstGeom prst="rect">
-            <a:avLst/>
-          </a:prstGeom>
-          <a:noFill/>
-        </p:spPr>
-        <p:txBody>
-          <a:bodyPr wrap="none" rtlCol="0">
-            <a:spAutoFit/>
-          </a:bodyPr>
-          <a:lstStyle/>
-          <a:p>
-            <a:r>
-              <a:rPr lang="pt-BR" sz="1400" b="1" dirty="0">
-                <a:solidFill>
-                  <a:srgbClr val="8FFB0D"/>
-                </a:solidFill>
-                <a:latin typeface="Montserrat" panose="00000500000000000000" pitchFamily="50" charset="0"/>
-              </a:rPr>
-              <a:t>GOOGLE ADWORDS | OUTUBRO 2022</a:t>
-            </a:r>
-          </a:p>
-        </p:txBody>
-      </p:sp>
     </p:spTree>
     <p:extLst>
       <p:ext uri="{BB962C8B-B14F-4D97-AF65-F5344CB8AC3E}">

</xml_diff>